<commit_message>
:memo: 更新 Sym PPT
</commit_message>
<xml_diff>
--- a/src/sym/syme-intro.pptx
+++ b/src/sym/syme-intro.pptx
@@ -5,40 +5,41 @@
     <p:sldMasterId id="2147483648" r:id="rId1"/>
   </p:sldMasterIdLst>
   <p:notesMasterIdLst>
-    <p:notesMasterId r:id="rId28"/>
+    <p:notesMasterId r:id="rId30"/>
   </p:notesMasterIdLst>
   <p:sldIdLst>
-    <p:sldId id="256" r:id="rId2"/>
-    <p:sldId id="257" r:id="rId3"/>
-    <p:sldId id="258" r:id="rId4"/>
-    <p:sldId id="259" r:id="rId5"/>
-    <p:sldId id="260" r:id="rId6"/>
-    <p:sldId id="261" r:id="rId7"/>
-    <p:sldId id="262" r:id="rId8"/>
-    <p:sldId id="263" r:id="rId9"/>
-    <p:sldId id="264" r:id="rId10"/>
-    <p:sldId id="265" r:id="rId11"/>
-    <p:sldId id="266" r:id="rId12"/>
-    <p:sldId id="267" r:id="rId13"/>
-    <p:sldId id="268" r:id="rId14"/>
-    <p:sldId id="269" r:id="rId15"/>
-    <p:sldId id="270" r:id="rId16"/>
-    <p:sldId id="271" r:id="rId17"/>
-    <p:sldId id="272" r:id="rId18"/>
-    <p:sldId id="273" r:id="rId19"/>
-    <p:sldId id="274" r:id="rId20"/>
-    <p:sldId id="275" r:id="rId21"/>
-    <p:sldId id="276" r:id="rId22"/>
-    <p:sldId id="277" r:id="rId23"/>
-    <p:sldId id="278" r:id="rId24"/>
-    <p:sldId id="279" r:id="rId25"/>
-    <p:sldId id="280" r:id="rId26"/>
-    <p:sldId id="281" r:id="rId27"/>
+    <p:sldId id="256" r:id="rId3"/>
+    <p:sldId id="257" r:id="rId4"/>
+    <p:sldId id="258" r:id="rId5"/>
+    <p:sldId id="259" r:id="rId6"/>
+    <p:sldId id="260" r:id="rId7"/>
+    <p:sldId id="261" r:id="rId8"/>
+    <p:sldId id="262" r:id="rId9"/>
+    <p:sldId id="263" r:id="rId10"/>
+    <p:sldId id="264" r:id="rId11"/>
+    <p:sldId id="265" r:id="rId12"/>
+    <p:sldId id="282" r:id="rId13"/>
+    <p:sldId id="266" r:id="rId14"/>
+    <p:sldId id="267" r:id="rId15"/>
+    <p:sldId id="268" r:id="rId16"/>
+    <p:sldId id="269" r:id="rId17"/>
+    <p:sldId id="270" r:id="rId18"/>
+    <p:sldId id="271" r:id="rId19"/>
+    <p:sldId id="272" r:id="rId20"/>
+    <p:sldId id="273" r:id="rId21"/>
+    <p:sldId id="274" r:id="rId22"/>
+    <p:sldId id="275" r:id="rId23"/>
+    <p:sldId id="276" r:id="rId24"/>
+    <p:sldId id="277" r:id="rId25"/>
+    <p:sldId id="278" r:id="rId26"/>
+    <p:sldId id="279" r:id="rId27"/>
+    <p:sldId id="280" r:id="rId28"/>
+    <p:sldId id="281" r:id="rId29"/>
   </p:sldIdLst>
   <p:sldSz cx="13004800" cy="9753600"/>
   <p:notesSz cx="6858000" cy="9144000"/>
   <p:custDataLst>
-    <p:tags r:id="rId29"/>
+    <p:tags r:id="rId34"/>
   </p:custDataLst>
   <p:defaultTextStyle>
     <a:defPPr marL="0" marR="0" indent="0" algn="l" defTabSz="914400" rtl="0" fontAlgn="auto" latinLnBrk="1" hangingPunct="0">
@@ -375,9 +376,7 @@
         <p:txBody>
           <a:bodyPr/>
           <a:lstStyle/>
-          <a:p>
-            <a:endParaRPr/>
-          </a:p>
+          <a:p/>
         </p:txBody>
       </p:sp>
       <p:sp>
@@ -402,9 +401,7 @@
         <p:txBody>
           <a:bodyPr/>
           <a:lstStyle/>
-          <a:p>
-            <a:endParaRPr/>
-          </a:p>
+          <a:p/>
         </p:txBody>
       </p:sp>
     </p:spTree>
@@ -488,7 +485,7 @@
 </file>
 
 <file path=ppt/slideLayouts/slideLayout1.xml><?xml version="1.0" encoding="utf-8"?>
-<p:sldLayout xmlns:a="http://schemas.openxmlformats.org/drawingml/2006/main" xmlns:r="http://schemas.openxmlformats.org/officeDocument/2006/relationships" xmlns:p="http://schemas.openxmlformats.org/presentationml/2006/main" showMasterSp="0" type="title">
+<p:sldLayout xmlns:a="http://schemas.openxmlformats.org/drawingml/2006/main" xmlns:r="http://schemas.openxmlformats.org/officeDocument/2006/relationships" xmlns:p="http://schemas.openxmlformats.org/presentationml/2006/main" type="title" showMasterSp="0">
   <p:cSld name="标题幻灯片">
     <p:spTree>
       <p:nvGrpSpPr>
@@ -662,7 +659,6 @@
           <a:p>
             <a:fld id="{86CB4B4D-7CA3-9044-876B-883B54F8677D}" type="slidenum">
               <a:rPr/>
-              <a:t>‹#›</a:t>
             </a:fld>
             <a:endParaRPr/>
           </a:p>
@@ -678,7 +674,7 @@
 </file>
 
 <file path=ppt/slideLayouts/slideLayout10.xml><?xml version="1.0" encoding="utf-8"?>
-<p:sldLayout xmlns:a="http://schemas.openxmlformats.org/drawingml/2006/main" xmlns:r="http://schemas.openxmlformats.org/officeDocument/2006/relationships" xmlns:p="http://schemas.openxmlformats.org/presentationml/2006/main" showMasterSp="0" type="tx">
+<p:sldLayout xmlns:a="http://schemas.openxmlformats.org/drawingml/2006/main" xmlns:r="http://schemas.openxmlformats.org/officeDocument/2006/relationships" xmlns:p="http://schemas.openxmlformats.org/presentationml/2006/main" type="tx" showMasterSp="0">
   <p:cSld name="标题和竖排文字">
     <p:spTree>
       <p:nvGrpSpPr>
@@ -817,7 +813,6 @@
           <a:p>
             <a:fld id="{86CB4B4D-7CA3-9044-876B-883B54F8677D}" type="slidenum">
               <a:rPr/>
-              <a:t>‹#›</a:t>
             </a:fld>
             <a:endParaRPr/>
           </a:p>
@@ -833,7 +828,7 @@
 </file>
 
 <file path=ppt/slideLayouts/slideLayout11.xml><?xml version="1.0" encoding="utf-8"?>
-<p:sldLayout xmlns:a="http://schemas.openxmlformats.org/drawingml/2006/main" xmlns:r="http://schemas.openxmlformats.org/officeDocument/2006/relationships" xmlns:p="http://schemas.openxmlformats.org/presentationml/2006/main" showMasterSp="0" type="tx">
+<p:sldLayout xmlns:a="http://schemas.openxmlformats.org/drawingml/2006/main" xmlns:r="http://schemas.openxmlformats.org/officeDocument/2006/relationships" xmlns:p="http://schemas.openxmlformats.org/presentationml/2006/main" type="tx" showMasterSp="0">
   <p:cSld name="垂直排列标题与文本">
     <p:spTree>
       <p:nvGrpSpPr>
@@ -972,7 +967,6 @@
           <a:p>
             <a:fld id="{86CB4B4D-7CA3-9044-876B-883B54F8677D}" type="slidenum">
               <a:rPr/>
-              <a:t>‹#›</a:t>
             </a:fld>
             <a:endParaRPr/>
           </a:p>
@@ -988,7 +982,7 @@
 </file>
 
 <file path=ppt/slideLayouts/slideLayout12.xml><?xml version="1.0" encoding="utf-8"?>
-<p:sldLayout xmlns:a="http://schemas.openxmlformats.org/drawingml/2006/main" xmlns:r="http://schemas.openxmlformats.org/officeDocument/2006/relationships" xmlns:p="http://schemas.openxmlformats.org/presentationml/2006/main" showMasterSp="0" type="tx">
+<p:sldLayout xmlns:a="http://schemas.openxmlformats.org/drawingml/2006/main" xmlns:r="http://schemas.openxmlformats.org/officeDocument/2006/relationships" xmlns:p="http://schemas.openxmlformats.org/presentationml/2006/main" type="tx" showMasterSp="0">
   <p:cSld name="标题与副标题">
     <p:bg>
       <p:bgPr>
@@ -1229,7 +1223,6 @@
           <a:p>
             <a:fld id="{86CB4B4D-7CA3-9044-876B-883B54F8677D}" type="slidenum">
               <a:rPr/>
-              <a:t>‹#›</a:t>
             </a:fld>
             <a:endParaRPr/>
           </a:p>
@@ -1245,7 +1238,7 @@
 </file>
 
 <file path=ppt/slideLayouts/slideLayout13.xml><?xml version="1.0" encoding="utf-8"?>
-<p:sldLayout xmlns:a="http://schemas.openxmlformats.org/drawingml/2006/main" xmlns:r="http://schemas.openxmlformats.org/officeDocument/2006/relationships" xmlns:p="http://schemas.openxmlformats.org/presentationml/2006/main" showMasterSp="0" type="tx">
+<p:sldLayout xmlns:a="http://schemas.openxmlformats.org/drawingml/2006/main" xmlns:r="http://schemas.openxmlformats.org/officeDocument/2006/relationships" xmlns:p="http://schemas.openxmlformats.org/presentationml/2006/main" type="tx" showMasterSp="0">
   <p:cSld name="标题和内容">
     <p:bg>
       <p:bgPr>
@@ -1471,7 +1464,6 @@
           <a:p>
             <a:fld id="{86CB4B4D-7CA3-9044-876B-883B54F8677D}" type="slidenum">
               <a:rPr/>
-              <a:t>‹#›</a:t>
             </a:fld>
             <a:endParaRPr/>
           </a:p>
@@ -1598,7 +1590,6 @@
           <a:p>
             <a:fld id="{86CB4B4D-7CA3-9044-876B-883B54F8677D}" type="slidenum">
               <a:rPr/>
-              <a:t>‹#›</a:t>
             </a:fld>
             <a:endParaRPr/>
           </a:p>
@@ -1614,7 +1605,7 @@
 </file>
 
 <file path=ppt/slideLayouts/slideLayout3.xml><?xml version="1.0" encoding="utf-8"?>
-<p:sldLayout xmlns:a="http://schemas.openxmlformats.org/drawingml/2006/main" xmlns:r="http://schemas.openxmlformats.org/officeDocument/2006/relationships" xmlns:p="http://schemas.openxmlformats.org/presentationml/2006/main" showMasterSp="0" type="tx">
+<p:sldLayout xmlns:a="http://schemas.openxmlformats.org/drawingml/2006/main" xmlns:r="http://schemas.openxmlformats.org/officeDocument/2006/relationships" xmlns:p="http://schemas.openxmlformats.org/presentationml/2006/main" type="tx" showMasterSp="0">
   <p:cSld name="节标题">
     <p:spTree>
       <p:nvGrpSpPr>
@@ -1803,7 +1794,6 @@
           <a:p>
             <a:fld id="{86CB4B4D-7CA3-9044-876B-883B54F8677D}" type="slidenum">
               <a:rPr/>
-              <a:t>‹#›</a:t>
             </a:fld>
             <a:endParaRPr/>
           </a:p>
@@ -1819,7 +1809,7 @@
 </file>
 
 <file path=ppt/slideLayouts/slideLayout4.xml><?xml version="1.0" encoding="utf-8"?>
-<p:sldLayout xmlns:a="http://schemas.openxmlformats.org/drawingml/2006/main" xmlns:r="http://schemas.openxmlformats.org/officeDocument/2006/relationships" xmlns:p="http://schemas.openxmlformats.org/presentationml/2006/main" showMasterSp="0" type="tx">
+<p:sldLayout xmlns:a="http://schemas.openxmlformats.org/drawingml/2006/main" xmlns:r="http://schemas.openxmlformats.org/officeDocument/2006/relationships" xmlns:p="http://schemas.openxmlformats.org/presentationml/2006/main" type="tx" showMasterSp="0">
   <p:cSld name="两栏内容">
     <p:spTree>
       <p:nvGrpSpPr>
@@ -1973,7 +1963,6 @@
           <a:p>
             <a:fld id="{86CB4B4D-7CA3-9044-876B-883B54F8677D}" type="slidenum">
               <a:rPr/>
-              <a:t>‹#›</a:t>
             </a:fld>
             <a:endParaRPr/>
           </a:p>
@@ -1989,7 +1978,7 @@
 </file>
 
 <file path=ppt/slideLayouts/slideLayout5.xml><?xml version="1.0" encoding="utf-8"?>
-<p:sldLayout xmlns:a="http://schemas.openxmlformats.org/drawingml/2006/main" xmlns:r="http://schemas.openxmlformats.org/officeDocument/2006/relationships" xmlns:p="http://schemas.openxmlformats.org/presentationml/2006/main" showMasterSp="0" type="tx">
+<p:sldLayout xmlns:a="http://schemas.openxmlformats.org/drawingml/2006/main" xmlns:r="http://schemas.openxmlformats.org/officeDocument/2006/relationships" xmlns:p="http://schemas.openxmlformats.org/presentationml/2006/main" type="tx" showMasterSp="0">
   <p:cSld name="比较">
     <p:spTree>
       <p:nvGrpSpPr>
@@ -2169,7 +2158,6 @@
               <a:buNone/>
               <a:defRPr sz="3400" b="1"/>
             </a:pPr>
-            <a:endParaRPr/>
           </a:p>
         </p:txBody>
       </p:sp>
@@ -2194,7 +2182,6 @@
           <a:p>
             <a:fld id="{86CB4B4D-7CA3-9044-876B-883B54F8677D}" type="slidenum">
               <a:rPr/>
-              <a:t>‹#›</a:t>
             </a:fld>
             <a:endParaRPr/>
           </a:p>
@@ -2210,7 +2197,7 @@
 </file>
 
 <file path=ppt/slideLayouts/slideLayout6.xml><?xml version="1.0" encoding="utf-8"?>
-<p:sldLayout xmlns:a="http://schemas.openxmlformats.org/drawingml/2006/main" xmlns:r="http://schemas.openxmlformats.org/officeDocument/2006/relationships" xmlns:p="http://schemas.openxmlformats.org/presentationml/2006/main" showMasterSp="0" type="tx">
+<p:sldLayout xmlns:a="http://schemas.openxmlformats.org/drawingml/2006/main" xmlns:r="http://schemas.openxmlformats.org/officeDocument/2006/relationships" xmlns:p="http://schemas.openxmlformats.org/presentationml/2006/main" type="tx" showMasterSp="0">
   <p:cSld name="仅标题">
     <p:spTree>
       <p:nvGrpSpPr>
@@ -2280,7 +2267,6 @@
           <a:p>
             <a:fld id="{86CB4B4D-7CA3-9044-876B-883B54F8677D}" type="slidenum">
               <a:rPr/>
-              <a:t>‹#›</a:t>
             </a:fld>
             <a:endParaRPr/>
           </a:p>
@@ -2296,7 +2282,7 @@
 </file>
 
 <file path=ppt/slideLayouts/slideLayout7.xml><?xml version="1.0" encoding="utf-8"?>
-<p:sldLayout xmlns:a="http://schemas.openxmlformats.org/drawingml/2006/main" xmlns:r="http://schemas.openxmlformats.org/officeDocument/2006/relationships" xmlns:p="http://schemas.openxmlformats.org/presentationml/2006/main" showMasterSp="0" type="tx">
+<p:sldLayout xmlns:a="http://schemas.openxmlformats.org/drawingml/2006/main" xmlns:r="http://schemas.openxmlformats.org/officeDocument/2006/relationships" xmlns:p="http://schemas.openxmlformats.org/presentationml/2006/main" type="tx" showMasterSp="0">
   <p:cSld name="空白">
     <p:spTree>
       <p:nvGrpSpPr>
@@ -2333,7 +2319,6 @@
           <a:p>
             <a:fld id="{86CB4B4D-7CA3-9044-876B-883B54F8677D}" type="slidenum">
               <a:rPr/>
-              <a:t>‹#›</a:t>
             </a:fld>
             <a:endParaRPr/>
           </a:p>
@@ -2349,7 +2334,7 @@
 </file>
 
 <file path=ppt/slideLayouts/slideLayout8.xml><?xml version="1.0" encoding="utf-8"?>
-<p:sldLayout xmlns:a="http://schemas.openxmlformats.org/drawingml/2006/main" xmlns:r="http://schemas.openxmlformats.org/officeDocument/2006/relationships" xmlns:p="http://schemas.openxmlformats.org/presentationml/2006/main" showMasterSp="0" type="tx">
+<p:sldLayout xmlns:a="http://schemas.openxmlformats.org/drawingml/2006/main" xmlns:r="http://schemas.openxmlformats.org/officeDocument/2006/relationships" xmlns:p="http://schemas.openxmlformats.org/presentationml/2006/main" type="tx" showMasterSp="0">
   <p:cSld name="内容与标题">
     <p:spTree>
       <p:nvGrpSpPr>
@@ -2499,7 +2484,6 @@
               <a:buNone/>
               <a:defRPr sz="1800"/>
             </a:pPr>
-            <a:endParaRPr/>
           </a:p>
         </p:txBody>
       </p:sp>
@@ -2524,7 +2508,6 @@
           <a:p>
             <a:fld id="{86CB4B4D-7CA3-9044-876B-883B54F8677D}" type="slidenum">
               <a:rPr/>
-              <a:t>‹#›</a:t>
             </a:fld>
             <a:endParaRPr/>
           </a:p>
@@ -2540,7 +2523,7 @@
 </file>
 
 <file path=ppt/slideLayouts/slideLayout9.xml><?xml version="1.0" encoding="utf-8"?>
-<p:sldLayout xmlns:a="http://schemas.openxmlformats.org/drawingml/2006/main" xmlns:r="http://schemas.openxmlformats.org/officeDocument/2006/relationships" xmlns:p="http://schemas.openxmlformats.org/presentationml/2006/main" showMasterSp="0" type="tx">
+<p:sldLayout xmlns:a="http://schemas.openxmlformats.org/drawingml/2006/main" xmlns:r="http://schemas.openxmlformats.org/officeDocument/2006/relationships" xmlns:p="http://schemas.openxmlformats.org/presentationml/2006/main" type="tx" showMasterSp="0">
   <p:cSld name="图片与标题">
     <p:spTree>
       <p:nvGrpSpPr>
@@ -2613,9 +2596,7 @@
             <a:noAutofit/>
           </a:bodyPr>
           <a:lstStyle/>
-          <a:p>
-            <a:endParaRPr/>
-          </a:p>
+          <a:p/>
         </p:txBody>
       </p:sp>
       <p:sp>
@@ -2738,7 +2719,6 @@
           <a:p>
             <a:fld id="{86CB4B4D-7CA3-9044-876B-883B54F8677D}" type="slidenum">
               <a:rPr/>
-              <a:t>‹#›</a:t>
             </a:fld>
             <a:endParaRPr/>
           </a:p>
@@ -2759,7 +2739,7 @@
     <p:bg>
       <p:bgPr>
         <a:blipFill rotWithShape="1">
-          <a:blip r:embed="rId15"/>
+          <a:blip r:embed="rId14"/>
           <a:srcRect/>
           <a:stretch>
             <a:fillRect/>
@@ -2789,7 +2769,7 @@
           <p:nvPr/>
         </p:nvPicPr>
         <p:blipFill>
-          <a:blip r:embed="rId16"/>
+          <a:blip r:embed="rId15"/>
           <a:stretch>
             <a:fillRect/>
           </a:stretch>
@@ -2839,7 +2819,6 @@
             <a:pPr>
               <a:defRPr sz="2000"/>
             </a:pPr>
-            <a:endParaRPr/>
           </a:p>
         </p:txBody>
       </p:sp>
@@ -2947,7 +2926,7 @@
           <p:nvPr/>
         </p:nvPicPr>
         <p:blipFill>
-          <a:blip r:embed="rId17"/>
+          <a:blip r:embed="rId16"/>
           <a:stretch>
             <a:fillRect/>
           </a:stretch>
@@ -3052,7 +3031,6 @@
           <a:p>
             <a:fld id="{86CB4B4D-7CA3-9044-876B-883B54F8677D}" type="slidenum">
               <a:rPr/>
-              <a:t>‹#›</a:t>
             </a:fld>
             <a:endParaRPr/>
           </a:p>
@@ -3850,7 +3828,7 @@
     <p:bg>
       <p:bgPr>
         <a:blipFill rotWithShape="1">
-          <a:blip r:embed="rId2"/>
+          <a:blip r:embed="rId1"/>
           <a:srcRect/>
           <a:tile tx="0" ty="0" sx="100000" sy="100000" flip="none" algn="tl"/>
         </a:blipFill>
@@ -3880,7 +3858,7 @@
           <p:nvPr/>
         </p:nvPicPr>
         <p:blipFill>
-          <a:blip r:embed="rId3"/>
+          <a:blip r:embed="rId2"/>
           <a:stretch>
             <a:fillRect/>
           </a:stretch>
@@ -3911,8 +3889,8 @@
         </p:nvSpPr>
         <p:spPr>
           <a:xfrm>
-            <a:off x="4130261" y="2816553"/>
-            <a:ext cx="7118097" cy="892048"/>
+            <a:off x="4130040" y="2656205"/>
+            <a:ext cx="6666865" cy="1052830"/>
           </a:xfrm>
           <a:prstGeom prst="rect">
             <a:avLst/>
@@ -3922,7 +3900,7 @@
           </a:ln>
         </p:spPr>
         <p:txBody>
-          <a:bodyPr wrap="none" lIns="65023" tIns="65023" rIns="65023" bIns="65023" anchor="b">
+          <a:bodyPr wrap="square" lIns="65023" tIns="65023" rIns="65023" bIns="65023" anchor="b">
             <a:spAutoFit/>
           </a:bodyPr>
           <a:lstStyle/>
@@ -3959,8 +3937,8 @@
         </p:nvSpPr>
         <p:spPr>
           <a:xfrm>
-            <a:off x="1950719" y="6153784"/>
-            <a:ext cx="9103361" cy="2492588"/>
+            <a:off x="3074035" y="5271135"/>
+            <a:ext cx="7722870" cy="1135380"/>
           </a:xfrm>
           <a:prstGeom prst="rect">
             <a:avLst/>
@@ -3973,6 +3951,198 @@
             <a:r>
               <a:t>背景、功能以及技术架构简介</a:t>
             </a:r>
+          </a:p>
+        </p:txBody>
+      </p:sp>
+      <p:sp>
+        <p:nvSpPr>
+          <p:cNvPr id="2" name="文本框 1"/>
+          <p:cNvSpPr txBox="1"/>
+          <p:nvPr/>
+        </p:nvSpPr>
+        <p:spPr>
+          <a:xfrm>
+            <a:off x="8720455" y="7628890"/>
+            <a:ext cx="2076450" cy="406400"/>
+          </a:xfrm>
+          <a:prstGeom prst="rect">
+            <a:avLst/>
+          </a:prstGeom>
+          <a:noFill/>
+          <a:ln w="12700" cap="flat">
+            <a:noFill/>
+            <a:miter lim="400000"/>
+          </a:ln>
+        </p:spPr>
+        <p:style>
+          <a:lnRef idx="0">
+            <a:srgbClr val="FFFFFF"/>
+          </a:lnRef>
+          <a:fillRef idx="0">
+            <a:srgbClr val="FFFFFF"/>
+          </a:fillRef>
+          <a:effectRef idx="0">
+            <a:srgbClr val="FFFFFF"/>
+          </a:effectRef>
+          <a:fontRef idx="none"/>
+        </p:style>
+        <p:txBody>
+          <a:bodyPr rot="0" vertOverflow="overflow" horzOverflow="overflow" vert="horz" wrap="none" lIns="65023" tIns="65023" rIns="65023" bIns="65023" numCol="1" spcCol="38100" rtlCol="0" anchor="t" forceAA="0">
+            <a:spAutoFit/>
+          </a:bodyPr>
+          <a:p>
+            <a:pPr marL="0" marR="0" indent="0" algn="l" defTabSz="1300480" rtl="0" fontAlgn="auto" latinLnBrk="0" hangingPunct="0">
+              <a:lnSpc>
+                <a:spcPct val="100000"/>
+              </a:lnSpc>
+              <a:spcBef>
+                <a:spcPts val="0"/>
+              </a:spcBef>
+              <a:spcAft>
+                <a:spcPts val="0"/>
+              </a:spcAft>
+              <a:buClrTx/>
+              <a:buSzTx/>
+              <a:buFontTx/>
+              <a:buNone/>
+            </a:pPr>
+            <a:r>
+              <a:rPr kumimoji="0" lang="en-US" altLang="zh-CN" sz="1800" b="0" i="0" u="none" strike="noStrike" cap="none" spc="0" normalizeH="0" baseline="0">
+                <a:ln>
+                  <a:noFill/>
+                </a:ln>
+                <a:solidFill>
+                  <a:schemeClr val="tx2">
+                    <a:lumMod val="20000"/>
+                    <a:lumOff val="80000"/>
+                  </a:schemeClr>
+                </a:solidFill>
+                <a:effectLst/>
+                <a:uFillTx/>
+                <a:latin typeface="+mj-lt"/>
+                <a:ea typeface="+mj-ea"/>
+                <a:cs typeface="+mj-cs"/>
+                <a:sym typeface="Franklin Gothic Book" panose="020B0503020102020204"/>
+              </a:rPr>
+              <a:t>2020</a:t>
+            </a:r>
+            <a:r>
+              <a:rPr kumimoji="0" lang="zh-CN" altLang="en-US" sz="1800" b="0" i="0" u="none" strike="noStrike" cap="none" spc="0" normalizeH="0" baseline="0">
+                <a:ln>
+                  <a:noFill/>
+                </a:ln>
+                <a:solidFill>
+                  <a:schemeClr val="tx2">
+                    <a:lumMod val="20000"/>
+                    <a:lumOff val="80000"/>
+                  </a:schemeClr>
+                </a:solidFill>
+                <a:effectLst/>
+                <a:uFillTx/>
+                <a:latin typeface="+mj-lt"/>
+                <a:ea typeface="宋体" panose="02010600030101010101" pitchFamily="2" charset="-122"/>
+                <a:cs typeface="+mj-cs"/>
+                <a:sym typeface="Franklin Gothic Book" panose="020B0503020102020204"/>
+              </a:rPr>
+              <a:t>年</a:t>
+            </a:r>
+            <a:r>
+              <a:rPr kumimoji="0" lang="en-US" altLang="zh-CN" sz="1800" b="0" i="0" u="none" strike="noStrike" cap="none" spc="0" normalizeH="0" baseline="0">
+                <a:ln>
+                  <a:noFill/>
+                </a:ln>
+                <a:solidFill>
+                  <a:schemeClr val="tx2">
+                    <a:lumMod val="20000"/>
+                    <a:lumOff val="80000"/>
+                  </a:schemeClr>
+                </a:solidFill>
+                <a:effectLst/>
+                <a:uFillTx/>
+                <a:latin typeface="+mj-lt"/>
+                <a:ea typeface="宋体" panose="02010600030101010101" pitchFamily="2" charset="-122"/>
+                <a:cs typeface="+mj-cs"/>
+                <a:sym typeface="Franklin Gothic Book" panose="020B0503020102020204"/>
+              </a:rPr>
+              <a:t>6</a:t>
+            </a:r>
+            <a:r>
+              <a:rPr kumimoji="0" lang="zh-CN" altLang="en-US" sz="1800" b="0" i="0" u="none" strike="noStrike" cap="none" spc="0" normalizeH="0" baseline="0">
+                <a:ln>
+                  <a:noFill/>
+                </a:ln>
+                <a:solidFill>
+                  <a:schemeClr val="tx2">
+                    <a:lumMod val="20000"/>
+                    <a:lumOff val="80000"/>
+                  </a:schemeClr>
+                </a:solidFill>
+                <a:effectLst/>
+                <a:uFillTx/>
+                <a:latin typeface="+mj-lt"/>
+                <a:ea typeface="宋体" panose="02010600030101010101" pitchFamily="2" charset="-122"/>
+                <a:cs typeface="+mj-cs"/>
+                <a:sym typeface="Franklin Gothic Book" panose="020B0503020102020204"/>
+              </a:rPr>
+              <a:t>月</a:t>
+            </a:r>
+            <a:r>
+              <a:rPr kumimoji="0" lang="en-US" altLang="zh-CN" sz="1800" b="0" i="0" u="none" strike="noStrike" cap="none" spc="0" normalizeH="0" baseline="0">
+                <a:ln>
+                  <a:noFill/>
+                </a:ln>
+                <a:solidFill>
+                  <a:schemeClr val="tx2">
+                    <a:lumMod val="20000"/>
+                    <a:lumOff val="80000"/>
+                  </a:schemeClr>
+                </a:solidFill>
+                <a:effectLst/>
+                <a:uFillTx/>
+                <a:latin typeface="+mj-lt"/>
+                <a:ea typeface="宋体" panose="02010600030101010101" pitchFamily="2" charset="-122"/>
+                <a:cs typeface="+mj-cs"/>
+                <a:sym typeface="Franklin Gothic Book" panose="020B0503020102020204"/>
+              </a:rPr>
+              <a:t>8</a:t>
+            </a:r>
+            <a:r>
+              <a:rPr kumimoji="0" lang="zh-CN" altLang="en-US" sz="1800" b="0" i="0" u="none" strike="noStrike" cap="none" spc="0" normalizeH="0" baseline="0">
+                <a:ln>
+                  <a:noFill/>
+                </a:ln>
+                <a:solidFill>
+                  <a:schemeClr val="tx2">
+                    <a:lumMod val="20000"/>
+                    <a:lumOff val="80000"/>
+                  </a:schemeClr>
+                </a:solidFill>
+                <a:effectLst/>
+                <a:uFillTx/>
+                <a:latin typeface="+mj-lt"/>
+                <a:ea typeface="宋体" panose="02010600030101010101" pitchFamily="2" charset="-122"/>
+                <a:cs typeface="+mj-cs"/>
+                <a:sym typeface="Franklin Gothic Book" panose="020B0503020102020204"/>
+              </a:rPr>
+              <a:t>日更新</a:t>
+            </a:r>
+            <a:endParaRPr kumimoji="0" lang="zh-CN" altLang="en-US" sz="1800" b="0" i="0" u="none" strike="noStrike" cap="none" spc="0" normalizeH="0" baseline="0">
+              <a:ln>
+                <a:noFill/>
+              </a:ln>
+              <a:solidFill>
+                <a:schemeClr val="tx2">
+                  <a:lumMod val="20000"/>
+                  <a:lumOff val="80000"/>
+                </a:schemeClr>
+              </a:solidFill>
+              <a:effectLst/>
+              <a:uFillTx/>
+              <a:latin typeface="+mj-lt"/>
+              <a:ea typeface="宋体" panose="02010600030101010101" pitchFamily="2" charset="-122"/>
+              <a:cs typeface="+mj-cs"/>
+              <a:sym typeface="Franklin Gothic Book" panose="020B0503020102020204"/>
+            </a:endParaRPr>
           </a:p>
         </p:txBody>
       </p:sp>
@@ -4085,129 +4255,76 @@
         <p:cNvGrpSpPr/>
         <p:nvPr/>
       </p:nvGrpSpPr>
-      <p:grpSpPr>
-        <a:xfrm>
-          <a:off x="0" y="0"/>
-          <a:ext cx="0" cy="0"/>
-          <a:chOff x="0" y="0"/>
-          <a:chExt cx="0" cy="0"/>
-        </a:xfrm>
-      </p:grpSpPr>
-      <p:sp>
-        <p:nvSpPr>
-          <p:cNvPr id="165" name="标题 1"/>
-          <p:cNvSpPr txBox="1">
+      <p:grpSpPr/>
+      <p:sp>
+        <p:nvSpPr>
+          <p:cNvPr id="2" name="标题 1"/>
+          <p:cNvSpPr>
             <a:spLocks noGrp="1"/>
           </p:cNvSpPr>
           <p:nvPr>
             <p:ph type="title"/>
           </p:nvPr>
         </p:nvSpPr>
-        <p:spPr>
-          <a:prstGeom prst="rect">
-            <a:avLst/>
-          </a:prstGeom>
-        </p:spPr>
+        <p:spPr/>
         <p:txBody>
           <a:bodyPr/>
-          <a:lstStyle/>
-          <a:p>
-            <a:r>
-              <a:t>隐私系统</a:t>
-            </a:r>
-          </a:p>
-        </p:txBody>
-      </p:sp>
-      <p:sp>
-        <p:nvSpPr>
-          <p:cNvPr id="166" name="内容占位符 2"/>
-          <p:cNvSpPr txBox="1">
+          <a:p>
+            <a:r>
+              <a:rPr lang="zh-CN" altLang="en-US"/>
+              <a:t>主持人系统</a:t>
+            </a:r>
+            <a:endParaRPr lang="zh-CN" altLang="en-US"/>
+          </a:p>
+        </p:txBody>
+      </p:sp>
+      <p:sp>
+        <p:nvSpPr>
+          <p:cNvPr id="3" name="文本占位符 2"/>
+          <p:cNvSpPr>
             <a:spLocks noGrp="1"/>
           </p:cNvSpPr>
           <p:nvPr>
             <p:ph type="body" idx="1"/>
           </p:nvPr>
         </p:nvSpPr>
-        <p:spPr>
-          <a:prstGeom prst="rect">
-            <a:avLst/>
-          </a:prstGeom>
-        </p:spPr>
+        <p:spPr/>
         <p:txBody>
           <a:bodyPr/>
-          <a:lstStyle/>
-          <a:p>
-            <a:r>
-              <a:t>内容可见性控制（打赏区、仅楼主可见、禁止非登录浏览等）</a:t>
-            </a:r>
-          </a:p>
-          <a:p>
-            <a:r>
-              <a:t>用户隐私开关</a:t>
-            </a:r>
-          </a:p>
-        </p:txBody>
-      </p:sp>
-      <p:pic>
-        <p:nvPicPr>
-          <p:cNvPr id="2" name="图片 1">
-            <a:extLst>
-              <a:ext uri="{FF2B5EF4-FFF2-40B4-BE49-F238E27FC236}">
-                <a16:creationId xmlns:a16="http://schemas.microsoft.com/office/drawing/2014/main" id="{662CA979-92E0-274B-B478-466866FD0350}"/>
-              </a:ext>
-            </a:extLst>
-          </p:cNvPr>
-          <p:cNvPicPr>
-            <a:picLocks noChangeAspect="1"/>
-          </p:cNvPicPr>
-          <p:nvPr/>
-        </p:nvPicPr>
-        <p:blipFill>
-          <a:blip r:embed="rId2"/>
-          <a:stretch>
-            <a:fillRect/>
-          </a:stretch>
-        </p:blipFill>
-        <p:spPr>
-          <a:xfrm>
-            <a:off x="609599" y="4740536"/>
-            <a:ext cx="4948519" cy="4453668"/>
-          </a:xfrm>
-          <a:prstGeom prst="rect">
-            <a:avLst/>
-          </a:prstGeom>
-        </p:spPr>
-      </p:pic>
-      <p:pic>
-        <p:nvPicPr>
-          <p:cNvPr id="3" name="图片 2">
-            <a:extLst>
-              <a:ext uri="{FF2B5EF4-FFF2-40B4-BE49-F238E27FC236}">
-                <a16:creationId xmlns:a16="http://schemas.microsoft.com/office/drawing/2014/main" id="{9D47DEA9-16FA-2D42-BEC1-1C4A0894C8E9}"/>
-              </a:ext>
-            </a:extLst>
-          </p:cNvPr>
-          <p:cNvPicPr>
-            <a:picLocks noChangeAspect="1"/>
-          </p:cNvPicPr>
-          <p:nvPr/>
-        </p:nvPicPr>
-        <p:blipFill>
-          <a:blip r:embed="rId3"/>
-          <a:stretch>
-            <a:fillRect/>
-          </a:stretch>
-        </p:blipFill>
-        <p:spPr>
-          <a:xfrm>
-            <a:off x="6029298" y="4740536"/>
-            <a:ext cx="5601286" cy="4453668"/>
-          </a:xfrm>
-          <a:prstGeom prst="rect">
-            <a:avLst/>
-          </a:prstGeom>
-        </p:spPr>
-      </p:pic>
+          <a:p>
+            <a:r>
+              <a:rPr lang="zh-CN" altLang="en-US"/>
+              <a:t>主持人类似传统论坛的版主，可更新管辖范围内的帖子、回帖和评论等内容</a:t>
+            </a:r>
+            <a:endParaRPr lang="zh-CN" altLang="en-US"/>
+          </a:p>
+          <a:p>
+            <a:r>
+              <a:rPr lang="zh-CN" altLang="en-US"/>
+              <a:t>根据管辖范围不同，分为标签主持人、领域主持人</a:t>
+            </a:r>
+            <a:endParaRPr lang="zh-CN" altLang="en-US"/>
+          </a:p>
+          <a:p>
+            <a:r>
+              <a:rPr lang="zh-CN" altLang="en-US"/>
+              <a:t>主持人权限可配置是否传播（由主持人再授权其他人成为主持人）</a:t>
+            </a:r>
+            <a:endParaRPr lang="zh-CN" altLang="en-US"/>
+          </a:p>
+          <a:p>
+            <a:r>
+              <a:rPr lang="zh-CN" altLang="en-US">
+                <a:ea typeface="宋体" panose="02010600030101010101" pitchFamily="2" charset="-122"/>
+              </a:rPr>
+              <a:t>主持人更新内容操作前台可浏览更新历史，后台生成审计日志</a:t>
+            </a:r>
+            <a:endParaRPr lang="zh-CN" altLang="en-US">
+              <a:ea typeface="宋体" panose="02010600030101010101" pitchFamily="2" charset="-122"/>
+            </a:endParaRPr>
+          </a:p>
+        </p:txBody>
+      </p:sp>
     </p:spTree>
   </p:cSld>
   <p:clrMapOvr>
@@ -4236,7 +4353,7 @@
       </p:grpSpPr>
       <p:sp>
         <p:nvSpPr>
-          <p:cNvPr id="169" name="标题 1"/>
+          <p:cNvPr id="165" name="标题 1"/>
           <p:cNvSpPr txBox="1">
             <a:spLocks noGrp="1"/>
           </p:cNvSpPr>
@@ -4254,14 +4371,14 @@
           <a:lstStyle/>
           <a:p>
             <a:r>
-              <a:t>通知系统</a:t>
-            </a:r>
-          </a:p>
-        </p:txBody>
-      </p:sp>
-      <p:sp>
-        <p:nvSpPr>
-          <p:cNvPr id="170" name="内容占位符 2"/>
+              <a:t>隐私系统</a:t>
+            </a:r>
+          </a:p>
+        </p:txBody>
+      </p:sp>
+      <p:sp>
+        <p:nvSpPr>
+          <p:cNvPr id="166" name="内容占位符 2"/>
           <p:cNvSpPr txBox="1">
             <a:spLocks noGrp="1"/>
           </p:cNvSpPr>
@@ -4279,26 +4396,64 @@
           <a:lstStyle/>
           <a:p>
             <a:r>
-              <a:t>详细的通知分类</a:t>
-            </a:r>
-          </a:p>
-          <a:p>
-            <a:r>
-              <a:t>WebSocket实时通知</a:t>
-            </a:r>
-          </a:p>
-          <a:p>
-            <a:r>
-              <a:t>合并频繁通知，减少打扰用户</a:t>
-            </a:r>
-          </a:p>
-          <a:p>
-            <a:r>
-              <a:t>支持浏览器离线通知（Chrome、FF、Edge）</a:t>
-            </a:r>
-          </a:p>
-        </p:txBody>
-      </p:sp>
+              <a:t>内容可见性控制（打赏区、仅楼主可见、禁止非登录浏览等）</a:t>
+            </a:r>
+          </a:p>
+          <a:p>
+            <a:r>
+              <a:t>用户隐私开关</a:t>
+            </a:r>
+          </a:p>
+        </p:txBody>
+      </p:sp>
+      <p:pic>
+        <p:nvPicPr>
+          <p:cNvPr id="2" name="图片 1"/>
+          <p:cNvPicPr>
+            <a:picLocks noChangeAspect="1"/>
+          </p:cNvPicPr>
+          <p:nvPr/>
+        </p:nvPicPr>
+        <p:blipFill>
+          <a:blip r:embed="rId1"/>
+          <a:stretch>
+            <a:fillRect/>
+          </a:stretch>
+        </p:blipFill>
+        <p:spPr>
+          <a:xfrm>
+            <a:off x="609599" y="4740536"/>
+            <a:ext cx="4948519" cy="4453668"/>
+          </a:xfrm>
+          <a:prstGeom prst="rect">
+            <a:avLst/>
+          </a:prstGeom>
+        </p:spPr>
+      </p:pic>
+      <p:pic>
+        <p:nvPicPr>
+          <p:cNvPr id="3" name="图片 2"/>
+          <p:cNvPicPr>
+            <a:picLocks noChangeAspect="1"/>
+          </p:cNvPicPr>
+          <p:nvPr/>
+        </p:nvPicPr>
+        <p:blipFill>
+          <a:blip r:embed="rId2"/>
+          <a:stretch>
+            <a:fillRect/>
+          </a:stretch>
+        </p:blipFill>
+        <p:spPr>
+          <a:xfrm>
+            <a:off x="6029298" y="4740536"/>
+            <a:ext cx="5601286" cy="4453668"/>
+          </a:xfrm>
+          <a:prstGeom prst="rect">
+            <a:avLst/>
+          </a:prstGeom>
+        </p:spPr>
+      </p:pic>
     </p:spTree>
   </p:cSld>
   <p:clrMapOvr>
@@ -4327,7 +4482,7 @@
       </p:grpSpPr>
       <p:sp>
         <p:nvSpPr>
-          <p:cNvPr id="172" name="标题 1"/>
+          <p:cNvPr id="169" name="标题 1"/>
           <p:cNvSpPr txBox="1">
             <a:spLocks noGrp="1"/>
           </p:cNvSpPr>
@@ -4345,14 +4500,14 @@
           <a:lstStyle/>
           <a:p>
             <a:r>
-              <a:t>举报系统</a:t>
-            </a:r>
-          </a:p>
-        </p:txBody>
-      </p:sp>
-      <p:sp>
-        <p:nvSpPr>
-          <p:cNvPr id="173" name="内容占位符 2"/>
+              <a:t>通知系统</a:t>
+            </a:r>
+          </a:p>
+        </p:txBody>
+      </p:sp>
+      <p:sp>
+        <p:nvSpPr>
+          <p:cNvPr id="170" name="内容占位符 2"/>
           <p:cNvSpPr txBox="1">
             <a:spLocks noGrp="1"/>
           </p:cNvSpPr>
@@ -4370,17 +4525,22 @@
           <a:lstStyle/>
           <a:p>
             <a:r>
-              <a:t>举报用户</a:t>
-            </a:r>
-          </a:p>
-          <a:p>
-            <a:r>
-              <a:t>举报帖子</a:t>
-            </a:r>
-          </a:p>
-          <a:p>
-            <a:r>
-              <a:t>举报内容可进行忽略/奖励</a:t>
+              <a:t>详细的通知分类</a:t>
+            </a:r>
+          </a:p>
+          <a:p>
+            <a:r>
+              <a:t>WebSocket实时通知</a:t>
+            </a:r>
+          </a:p>
+          <a:p>
+            <a:r>
+              <a:t>合并频繁通知，减少打扰用户</a:t>
+            </a:r>
+          </a:p>
+          <a:p>
+            <a:r>
+              <a:t>支持浏览器离线通知（Chrome、FF、Edge）</a:t>
             </a:r>
           </a:p>
         </p:txBody>
@@ -4413,7 +4573,7 @@
       </p:grpSpPr>
       <p:sp>
         <p:nvSpPr>
-          <p:cNvPr id="175" name="标题 1"/>
+          <p:cNvPr id="172" name="标题 1"/>
           <p:cNvSpPr txBox="1">
             <a:spLocks noGrp="1"/>
           </p:cNvSpPr>
@@ -4431,14 +4591,14 @@
           <a:lstStyle/>
           <a:p>
             <a:r>
-              <a:t>搜索系统</a:t>
-            </a:r>
-          </a:p>
-        </p:txBody>
-      </p:sp>
-      <p:sp>
-        <p:nvSpPr>
-          <p:cNvPr id="176" name="内容占位符 2"/>
+              <a:t>举报系统</a:t>
+            </a:r>
+          </a:p>
+        </p:txBody>
+      </p:sp>
+      <p:sp>
+        <p:nvSpPr>
+          <p:cNvPr id="173" name="内容占位符 2"/>
           <p:cNvSpPr txBox="1">
             <a:spLocks noGrp="1"/>
           </p:cNvSpPr>
@@ -4456,12 +4616,17 @@
           <a:lstStyle/>
           <a:p>
             <a:r>
-              <a:t>零开发对接Algolia</a:t>
-            </a:r>
-          </a:p>
-          <a:p>
-            <a:r>
-              <a:t>少量二开对接Elasticsearch</a:t>
+              <a:t>举报用户</a:t>
+            </a:r>
+          </a:p>
+          <a:p>
+            <a:r>
+              <a:t>举报帖子</a:t>
+            </a:r>
+          </a:p>
+          <a:p>
+            <a:r>
+              <a:t>举报内容可进行忽略/奖励</a:t>
             </a:r>
           </a:p>
         </p:txBody>
@@ -4494,7 +4659,7 @@
       </p:grpSpPr>
       <p:sp>
         <p:nvSpPr>
-          <p:cNvPr id="178" name="标题 1"/>
+          <p:cNvPr id="175" name="标题 1"/>
           <p:cNvSpPr txBox="1">
             <a:spLocks noGrp="1"/>
           </p:cNvSpPr>
@@ -4512,14 +4677,14 @@
           <a:lstStyle/>
           <a:p>
             <a:r>
-              <a:t>微信、第三方账号相关</a:t>
-            </a:r>
-          </a:p>
-        </p:txBody>
-      </p:sp>
-      <p:sp>
-        <p:nvSpPr>
-          <p:cNvPr id="179" name="内容占位符 2"/>
+              <a:t>搜索系统</a:t>
+            </a:r>
+          </a:p>
+        </p:txBody>
+      </p:sp>
+      <p:sp>
+        <p:nvSpPr>
+          <p:cNvPr id="176" name="内容占位符 2"/>
           <p:cNvSpPr txBox="1">
             <a:spLocks noGrp="1"/>
           </p:cNvSpPr>
@@ -4537,12 +4702,7 @@
           <a:lstStyle/>
           <a:p>
             <a:r>
-              <a:t>微信公众号、小程序对接</a:t>
-            </a:r>
-          </a:p>
-          <a:p>
-            <a:r>
-              <a:t>支持通过微博、QQ、微信账号登录</a:t>
+              <a:t>少量二开对接Elasticsearch</a:t>
             </a:r>
           </a:p>
         </p:txBody>
@@ -4575,7 +4735,7 @@
       </p:grpSpPr>
       <p:sp>
         <p:nvSpPr>
-          <p:cNvPr id="181" name="标题 1"/>
+          <p:cNvPr id="178" name="标题 1"/>
           <p:cNvSpPr txBox="1">
             <a:spLocks noGrp="1"/>
           </p:cNvSpPr>
@@ -4593,14 +4753,14 @@
           <a:lstStyle/>
           <a:p>
             <a:r>
-              <a:t>API</a:t>
-            </a:r>
-          </a:p>
-        </p:txBody>
-      </p:sp>
-      <p:sp>
-        <p:nvSpPr>
-          <p:cNvPr id="182" name="内容占位符 2"/>
+              <a:t>微信、第三方账号相关</a:t>
+            </a:r>
+          </a:p>
+        </p:txBody>
+      </p:sp>
+      <p:sp>
+        <p:nvSpPr>
+          <p:cNvPr id="179" name="内容占位符 2"/>
           <p:cNvSpPr txBox="1">
             <a:spLocks noGrp="1"/>
           </p:cNvSpPr>
@@ -4618,22 +4778,12 @@
           <a:lstStyle/>
           <a:p>
             <a:r>
-              <a:t>提供丰富的API给APP客户端或者其他系统进行交互联动</a:t>
-            </a:r>
-          </a:p>
-          <a:p>
-            <a:r>
-              <a:rPr u="sng">
-                <a:solidFill>
-                  <a:srgbClr val="0563C1"/>
-                </a:solidFill>
-                <a:uFill>
-                  <a:solidFill>
-                    <a:srgbClr val="0563C1"/>
-                  </a:solidFill>
-                </a:uFill>
-              </a:rPr>
-              <a:t>API文档</a:t>
+              <a:t>微信公众号、小程序对接</a:t>
+            </a:r>
+          </a:p>
+          <a:p>
+            <a:r>
+              <a:t>支持通过微博、QQ、微信账号登录</a:t>
             </a:r>
           </a:p>
         </p:txBody>
@@ -4666,7 +4816,7 @@
       </p:grpSpPr>
       <p:sp>
         <p:nvSpPr>
-          <p:cNvPr id="184" name="标题 1"/>
+          <p:cNvPr id="181" name="标题 1"/>
           <p:cNvSpPr txBox="1">
             <a:spLocks noGrp="1"/>
           </p:cNvSpPr>
@@ -4684,14 +4834,14 @@
           <a:lstStyle/>
           <a:p>
             <a:r>
-              <a:t>其他功能</a:t>
-            </a:r>
-          </a:p>
-        </p:txBody>
-      </p:sp>
-      <p:sp>
-        <p:nvSpPr>
-          <p:cNvPr id="185" name="内容占位符 2"/>
+              <a:t>API</a:t>
+            </a:r>
+          </a:p>
+        </p:txBody>
+      </p:sp>
+      <p:sp>
+        <p:nvSpPr>
+          <p:cNvPr id="182" name="内容占位符 2"/>
           <p:cNvSpPr txBox="1">
             <a:spLocks noGrp="1"/>
           </p:cNvSpPr>
@@ -4708,139 +4858,34 @@
           <a:bodyPr/>
           <a:lstStyle/>
           <a:p>
-            <a:pPr marL="316865" indent="-316865" defTabSz="1287145">
-              <a:lnSpc>
-                <a:spcPct val="81000"/>
-              </a:lnSpc>
-              <a:defRPr sz="2770"/>
-            </a:pPr>
-            <a:r>
-              <a:t>简单的微博</a:t>
-            </a:r>
-          </a:p>
-          <a:p>
-            <a:pPr marL="316865" indent="-316865" defTabSz="1287145">
-              <a:lnSpc>
-                <a:spcPct val="81000"/>
-              </a:lnSpc>
-              <a:defRPr sz="2770"/>
-            </a:pPr>
-            <a:r>
-              <a:t>注销账号</a:t>
-            </a:r>
-          </a:p>
-          <a:p>
-            <a:pPr marL="316865" indent="-316865" defTabSz="1287145">
-              <a:lnSpc>
-                <a:spcPct val="81000"/>
-              </a:lnSpc>
-              <a:defRPr sz="2770"/>
-            </a:pPr>
-            <a:r>
-              <a:t>语音摘要</a:t>
-            </a:r>
-          </a:p>
-          <a:p>
-            <a:pPr marL="316865" indent="-316865" defTabSz="1287145">
-              <a:lnSpc>
-                <a:spcPct val="81000"/>
-              </a:lnSpc>
-              <a:defRPr sz="2770"/>
-            </a:pPr>
-            <a:r>
-              <a:t>快捷键</a:t>
-            </a:r>
-          </a:p>
-          <a:p>
-            <a:pPr marL="316865" indent="-316865" defTabSz="1287145">
-              <a:lnSpc>
-                <a:spcPct val="81000"/>
-              </a:lnSpc>
-              <a:defRPr sz="2770"/>
-            </a:pPr>
-            <a:r>
-              <a:t>匿名发帖</a:t>
-            </a:r>
-          </a:p>
-          <a:p>
-            <a:pPr marL="316865" indent="-316865" defTabSz="1287145">
-              <a:lnSpc>
-                <a:spcPct val="81000"/>
-              </a:lnSpc>
-              <a:defRPr sz="2770"/>
-            </a:pPr>
-            <a:r>
-              <a:t>音视频播放</a:t>
-            </a:r>
-          </a:p>
-          <a:p>
-            <a:pPr marL="316865" indent="-316865" defTabSz="1287145">
-              <a:lnSpc>
-                <a:spcPct val="81000"/>
-              </a:lnSpc>
-              <a:defRPr sz="2770"/>
-            </a:pPr>
-            <a:r>
-              <a:t>录音发帖</a:t>
-            </a:r>
-          </a:p>
-          <a:p>
-            <a:pPr marL="316865" indent="-316865" defTabSz="1287145">
-              <a:lnSpc>
-                <a:spcPct val="81000"/>
-              </a:lnSpc>
-              <a:defRPr sz="2770"/>
-            </a:pPr>
-            <a:r>
-              <a:rPr lang="zh-CN">
-                <a:ea typeface="宋体" panose="02010600030101010101" pitchFamily="2" charset="-122"/>
+            <a:r>
+              <a:t>提供丰富的API给APP客户端或者其他系统进行交互联动</a:t>
+            </a:r>
+          </a:p>
+          <a:p>
+            <a:r>
+              <a:rPr u="sng">
+                <a:solidFill>
+                  <a:srgbClr val="0563C1"/>
+                </a:solidFill>
+                <a:uFill>
+                  <a:solidFill>
+                    <a:srgbClr val="0563C1"/>
+                  </a:solidFill>
+                </a:uFill>
               </a:rPr>
-              <a:t>投票表单</a:t>
-            </a:r>
-          </a:p>
-          <a:p>
-            <a:pPr marL="316865" indent="-316865" defTabSz="1287145">
-              <a:lnSpc>
-                <a:spcPct val="81000"/>
-              </a:lnSpc>
-              <a:defRPr sz="2770"/>
-            </a:pPr>
-            <a:r>
-              <a:t>多主题</a:t>
-            </a:r>
-          </a:p>
-          <a:p>
-            <a:pPr marL="316865" indent="-316865" defTabSz="1287145">
-              <a:lnSpc>
-                <a:spcPct val="81000"/>
-              </a:lnSpc>
-              <a:defRPr sz="2770"/>
-            </a:pPr>
-            <a:r>
-              <a:t>多维度用户数据统计</a:t>
-            </a:r>
-          </a:p>
-          <a:p>
-            <a:pPr marL="316865" indent="-316865" defTabSz="1287145">
-              <a:lnSpc>
-                <a:spcPct val="81000"/>
-              </a:lnSpc>
-              <a:defRPr sz="2770"/>
-            </a:pPr>
-            <a:r>
-              <a:t>多语言国际化</a:t>
-            </a:r>
-          </a:p>
-          <a:p>
-            <a:pPr marL="316865" indent="-316865" defTabSz="1287145">
-              <a:lnSpc>
-                <a:spcPct val="81000"/>
-              </a:lnSpc>
-              <a:defRPr sz="2770"/>
-            </a:pPr>
-            <a:r>
-              <a:t>……</a:t>
-            </a:r>
+              <a:t>API文档</a:t>
+            </a:r>
+            <a:endParaRPr u="sng">
+              <a:solidFill>
+                <a:srgbClr val="0563C1"/>
+              </a:solidFill>
+              <a:uFill>
+                <a:solidFill>
+                  <a:srgbClr val="0563C1"/>
+                </a:solidFill>
+              </a:uFill>
+            </a:endParaRPr>
           </a:p>
         </p:txBody>
       </p:sp>
@@ -4872,7 +4917,7 @@
       </p:grpSpPr>
       <p:sp>
         <p:nvSpPr>
-          <p:cNvPr id="187" name="标题 1"/>
+          <p:cNvPr id="184" name="标题 1"/>
           <p:cNvSpPr txBox="1">
             <a:spLocks noGrp="1"/>
           </p:cNvSpPr>
@@ -4890,14 +4935,14 @@
           <a:lstStyle/>
           <a:p>
             <a:r>
-              <a:t>环境搭建</a:t>
-            </a:r>
-          </a:p>
-        </p:txBody>
-      </p:sp>
-      <p:sp>
-        <p:nvSpPr>
-          <p:cNvPr id="188" name="内容占位符 2"/>
+              <a:t>其他功能</a:t>
+            </a:r>
+          </a:p>
+        </p:txBody>
+      </p:sp>
+      <p:sp>
+        <p:nvSpPr>
+          <p:cNvPr id="185" name="内容占位符 2"/>
           <p:cNvSpPr txBox="1">
             <a:spLocks noGrp="1"/>
           </p:cNvSpPr>
@@ -4914,48 +4959,175 @@
           <a:bodyPr/>
           <a:lstStyle/>
           <a:p>
-            <a:r>
-              <a:t>JDK 8</a:t>
-            </a:r>
-          </a:p>
-          <a:p>
-            <a:r>
-              <a:t>MySQL 5.7+</a:t>
-            </a:r>
-          </a:p>
-          <a:p>
-            <a:r>
-              <a:t>Tomcat/Jetty 9</a:t>
-            </a:r>
-          </a:p>
-          <a:p>
-            <a:r>
-              <a:t>Maven</a:t>
-            </a:r>
-          </a:p>
-          <a:p>
-            <a:endParaRPr/>
-          </a:p>
-          <a:p>
-            <a:pPr marL="0" indent="0">
-              <a:buSzTx/>
-              <a:buNone/>
+            <a:pPr marL="316865" indent="-316865" defTabSz="1287145">
+              <a:lnSpc>
+                <a:spcPct val="81000"/>
+              </a:lnSpc>
+              <a:defRPr sz="2770"/>
             </a:pPr>
             <a:r>
-              <a:t>细节请参考</a:t>
-            </a:r>
-            <a:r>
-              <a:rPr u="sng">
-                <a:solidFill>
-                  <a:srgbClr val="0563C1"/>
-                </a:solidFill>
-                <a:uFill>
-                  <a:solidFill>
-                    <a:srgbClr val="0563C1"/>
-                  </a:solidFill>
-                </a:uFill>
+              <a:rPr lang="zh-CN">
+                <a:ea typeface="宋体" panose="02010600030101010101" pitchFamily="2" charset="-122"/>
               </a:rPr>
-              <a:t>《Sym安装指南》</a:t>
+              <a:t>清风明月（</a:t>
+            </a:r>
+            <a:r>
+              <a:t>简单的</a:t>
+            </a:r>
+            <a:r>
+              <a:rPr lang="en-US"/>
+              <a:t>“</a:t>
+            </a:r>
+            <a:r>
+              <a:rPr lang="zh-CN">
+                <a:ea typeface="宋体" panose="02010600030101010101" pitchFamily="2" charset="-122"/>
+              </a:rPr>
+              <a:t>说说</a:t>
+            </a:r>
+            <a:r>
+              <a:rPr lang="en-US" altLang="zh-CN">
+                <a:ea typeface="宋体" panose="02010600030101010101" pitchFamily="2" charset="-122"/>
+              </a:rPr>
+              <a:t>”</a:t>
+            </a:r>
+            <a:r>
+              <a:rPr lang="zh-CN" altLang="en-US">
+                <a:ea typeface="宋体" panose="02010600030101010101" pitchFamily="2" charset="-122"/>
+              </a:rPr>
+              <a:t>功能</a:t>
+            </a:r>
+            <a:r>
+              <a:rPr lang="zh-CN">
+                <a:ea typeface="宋体" panose="02010600030101010101" pitchFamily="2" charset="-122"/>
+              </a:rPr>
+              <a:t>）</a:t>
+            </a:r>
+          </a:p>
+          <a:p>
+            <a:pPr marL="316865" indent="-316865" defTabSz="1287145">
+              <a:lnSpc>
+                <a:spcPct val="81000"/>
+              </a:lnSpc>
+              <a:defRPr sz="2770"/>
+            </a:pPr>
+            <a:r>
+              <a:t>注销账号</a:t>
+            </a:r>
+          </a:p>
+          <a:p>
+            <a:pPr marL="316865" indent="-316865" defTabSz="1287145">
+              <a:lnSpc>
+                <a:spcPct val="81000"/>
+              </a:lnSpc>
+              <a:defRPr sz="2770"/>
+            </a:pPr>
+            <a:r>
+              <a:t>语音摘要</a:t>
+            </a:r>
+          </a:p>
+          <a:p>
+            <a:pPr marL="316865" indent="-316865" defTabSz="1287145">
+              <a:lnSpc>
+                <a:spcPct val="81000"/>
+              </a:lnSpc>
+              <a:defRPr sz="2770"/>
+            </a:pPr>
+            <a:r>
+              <a:t>快捷键</a:t>
+            </a:r>
+          </a:p>
+          <a:p>
+            <a:pPr marL="316865" indent="-316865" defTabSz="1287145">
+              <a:lnSpc>
+                <a:spcPct val="81000"/>
+              </a:lnSpc>
+              <a:defRPr sz="2770"/>
+            </a:pPr>
+            <a:r>
+              <a:t>匿名发帖</a:t>
+            </a:r>
+          </a:p>
+          <a:p>
+            <a:pPr marL="316865" indent="-316865" defTabSz="1287145">
+              <a:lnSpc>
+                <a:spcPct val="81000"/>
+              </a:lnSpc>
+              <a:defRPr sz="2770"/>
+            </a:pPr>
+            <a:r>
+              <a:t>音视频播放</a:t>
+            </a:r>
+          </a:p>
+          <a:p>
+            <a:pPr marL="316865" indent="-316865" defTabSz="1287145">
+              <a:lnSpc>
+                <a:spcPct val="81000"/>
+              </a:lnSpc>
+              <a:defRPr sz="2770"/>
+            </a:pPr>
+            <a:r>
+              <a:t>录音发帖</a:t>
+            </a:r>
+          </a:p>
+          <a:p>
+            <a:pPr marL="316865" indent="-316865" defTabSz="1287145">
+              <a:lnSpc>
+                <a:spcPct val="81000"/>
+              </a:lnSpc>
+              <a:defRPr sz="2770"/>
+            </a:pPr>
+            <a:r>
+              <a:rPr lang="zh-CN">
+                <a:ea typeface="宋体" panose="02010600030101010101" pitchFamily="2" charset="-122"/>
+              </a:rPr>
+              <a:t>投票表单</a:t>
+            </a:r>
+            <a:endParaRPr lang="zh-CN">
+              <a:ea typeface="宋体" panose="02010600030101010101" pitchFamily="2" charset="-122"/>
+            </a:endParaRPr>
+          </a:p>
+          <a:p>
+            <a:pPr marL="316865" indent="-316865" defTabSz="1287145">
+              <a:lnSpc>
+                <a:spcPct val="81000"/>
+              </a:lnSpc>
+              <a:defRPr sz="2770"/>
+            </a:pPr>
+            <a:r>
+              <a:t>多主题</a:t>
+            </a:r>
+          </a:p>
+          <a:p>
+            <a:pPr marL="316865" indent="-316865" defTabSz="1287145">
+              <a:lnSpc>
+                <a:spcPct val="81000"/>
+              </a:lnSpc>
+              <a:defRPr sz="2770"/>
+            </a:pPr>
+            <a:r>
+              <a:t>多维度用户数据统计</a:t>
+            </a:r>
+          </a:p>
+          <a:p>
+            <a:pPr marL="316865" indent="-316865" defTabSz="1287145">
+              <a:lnSpc>
+                <a:spcPct val="81000"/>
+              </a:lnSpc>
+              <a:defRPr sz="2770"/>
+            </a:pPr>
+            <a:r>
+              <a:t>多语言国际化</a:t>
+            </a:r>
+          </a:p>
+          <a:p>
+            <a:pPr marL="316865" indent="-316865" defTabSz="1287145">
+              <a:lnSpc>
+                <a:spcPct val="81000"/>
+              </a:lnSpc>
+              <a:defRPr sz="2770"/>
+            </a:pPr>
+            <a:r>
+              <a:t>……</a:t>
             </a:r>
           </a:p>
         </p:txBody>
@@ -4988,7 +5160,7 @@
       </p:grpSpPr>
       <p:sp>
         <p:nvSpPr>
-          <p:cNvPr id="190" name="标题 1"/>
+          <p:cNvPr id="187" name="标题 1"/>
           <p:cNvSpPr txBox="1">
             <a:spLocks noGrp="1"/>
           </p:cNvSpPr>
@@ -5006,14 +5178,14 @@
           <a:lstStyle/>
           <a:p>
             <a:r>
-              <a:t>技术架构</a:t>
-            </a:r>
-          </a:p>
-        </p:txBody>
-      </p:sp>
-      <p:sp>
-        <p:nvSpPr>
-          <p:cNvPr id="191" name="内容占位符 2"/>
+              <a:t>环境搭建</a:t>
+            </a:r>
+          </a:p>
+        </p:txBody>
+      </p:sp>
+      <p:sp>
+        <p:nvSpPr>
+          <p:cNvPr id="188" name="内容占位符 2"/>
           <p:cNvSpPr txBox="1">
             <a:spLocks noGrp="1"/>
           </p:cNvSpPr>
@@ -5031,38 +5203,58 @@
           <a:lstStyle/>
           <a:p>
             <a:r>
-              <a:t>开发框架</a:t>
-            </a:r>
-          </a:p>
-          <a:p>
-            <a:r>
-              <a:t>MVC分层</a:t>
-            </a:r>
-          </a:p>
-          <a:p>
-            <a:r>
-              <a:t>移动端</a:t>
-            </a:r>
-          </a:p>
-          <a:p>
-            <a:r>
-              <a:t>SEO</a:t>
-            </a:r>
-          </a:p>
-          <a:p>
-            <a:r>
-              <a:t>性能优化</a:t>
-            </a:r>
-          </a:p>
-          <a:p>
-            <a:r>
-              <a:t>安全性</a:t>
-            </a:r>
-          </a:p>
-          <a:p>
-            <a:r>
-              <a:t>集群部署</a:t>
-            </a:r>
+              <a:t>JDK 8</a:t>
+            </a:r>
+          </a:p>
+          <a:p>
+            <a:r>
+              <a:t>MySQL </a:t>
+            </a:r>
+            <a:r>
+              <a:rPr lang="en-US"/>
+              <a:t>8</a:t>
+            </a:r>
+            <a:r>
+              <a:t>+</a:t>
+            </a:r>
+          </a:p>
+          <a:p>
+            <a:r>
+              <a:t>Maven</a:t>
+            </a:r>
+          </a:p>
+          <a:p/>
+          <a:p>
+            <a:pPr marL="0" indent="0">
+              <a:buSzTx/>
+              <a:buNone/>
+            </a:pPr>
+            <a:r>
+              <a:t>细节请参考</a:t>
+            </a:r>
+            <a:r>
+              <a:rPr u="sng">
+                <a:solidFill>
+                  <a:srgbClr val="0563C1"/>
+                </a:solidFill>
+                <a:uFill>
+                  <a:solidFill>
+                    <a:srgbClr val="0563C1"/>
+                  </a:solidFill>
+                </a:uFill>
+              </a:rPr>
+              <a:t>《Sym安装指南》</a:t>
+            </a:r>
+            <a:endParaRPr u="sng">
+              <a:solidFill>
+                <a:srgbClr val="0563C1"/>
+              </a:solidFill>
+              <a:uFill>
+                <a:solidFill>
+                  <a:srgbClr val="0563C1"/>
+                </a:solidFill>
+              </a:uFill>
+            </a:endParaRPr>
           </a:p>
         </p:txBody>
       </p:sp>
@@ -5218,13 +5410,13 @@
   <p:clrMapOvr>
     <a:masterClrMapping/>
   </p:clrMapOvr>
-  <mc:AlternateContent xmlns:mc="http://schemas.openxmlformats.org/markup-compatibility/2006" xmlns:p14="http://schemas.microsoft.com/office/powerpoint/2010/main">
-    <mc:Choice Requires="p14">
+  <mc:AlternateContent xmlns:mc="http://schemas.openxmlformats.org/markup-compatibility/2006">
+    <mc:Choice xmlns:p14="http://schemas.microsoft.com/office/powerpoint/2010/main" Requires="p14">
       <p:transition spd="slow" p14:dur="1500">
         <p:dissolve/>
       </p:transition>
     </mc:Choice>
-    <mc:Fallback xmlns="">
+    <mc:Fallback>
       <p:transition spd="slow">
         <p:dissolve/>
       </p:transition>
@@ -5252,7 +5444,7 @@
       </p:grpSpPr>
       <p:sp>
         <p:nvSpPr>
-          <p:cNvPr id="193" name="标题 1"/>
+          <p:cNvPr id="190" name="标题 1"/>
           <p:cNvSpPr txBox="1">
             <a:spLocks noGrp="1"/>
           </p:cNvSpPr>
@@ -5270,14 +5462,14 @@
           <a:lstStyle/>
           <a:p>
             <a:r>
-              <a:t>开发框架</a:t>
-            </a:r>
-          </a:p>
-        </p:txBody>
-      </p:sp>
-      <p:sp>
-        <p:nvSpPr>
-          <p:cNvPr id="194" name="内容占位符 2"/>
+              <a:t>技术架构</a:t>
+            </a:r>
+          </a:p>
+        </p:txBody>
+      </p:sp>
+      <p:sp>
+        <p:nvSpPr>
+          <p:cNvPr id="191" name="内容占位符 2"/>
           <p:cNvSpPr txBox="1">
             <a:spLocks noGrp="1"/>
           </p:cNvSpPr>
@@ -5295,17 +5487,37 @@
           <a:lstStyle/>
           <a:p>
             <a:r>
-              <a:t>基于Latke开发，类似SpringMVC的轻量级Servlet框架</a:t>
-            </a:r>
-          </a:p>
-          <a:p>
-            <a:r>
-              <a:t>服务端模板使用FreeMarker</a:t>
-            </a:r>
-          </a:p>
-          <a:p>
-            <a:r>
-              <a:t>前端jQuery，webpack打包</a:t>
+              <a:t>开发框架</a:t>
+            </a:r>
+          </a:p>
+          <a:p>
+            <a:r>
+              <a:t>MVC分层</a:t>
+            </a:r>
+          </a:p>
+          <a:p>
+            <a:r>
+              <a:t>移动端</a:t>
+            </a:r>
+          </a:p>
+          <a:p>
+            <a:r>
+              <a:t>SEO</a:t>
+            </a:r>
+          </a:p>
+          <a:p>
+            <a:r>
+              <a:t>性能优化</a:t>
+            </a:r>
+          </a:p>
+          <a:p>
+            <a:r>
+              <a:t>安全性</a:t>
+            </a:r>
+          </a:p>
+          <a:p>
+            <a:r>
+              <a:t>集群部署</a:t>
             </a:r>
           </a:p>
         </p:txBody>
@@ -5338,7 +5550,7 @@
       </p:grpSpPr>
       <p:sp>
         <p:nvSpPr>
-          <p:cNvPr id="196" name="标题 1"/>
+          <p:cNvPr id="193" name="标题 1"/>
           <p:cNvSpPr txBox="1">
             <a:spLocks noGrp="1"/>
           </p:cNvSpPr>
@@ -5356,14 +5568,14 @@
           <a:lstStyle/>
           <a:p>
             <a:r>
-              <a:t>MVC分层</a:t>
-            </a:r>
-          </a:p>
-        </p:txBody>
-      </p:sp>
-      <p:sp>
-        <p:nvSpPr>
-          <p:cNvPr id="197" name="内容占位符 2"/>
+              <a:t>开发框架</a:t>
+            </a:r>
+          </a:p>
+        </p:txBody>
+      </p:sp>
+      <p:sp>
+        <p:nvSpPr>
+          <p:cNvPr id="194" name="内容占位符 2"/>
           <p:cNvSpPr txBox="1">
             <a:spLocks noGrp="1"/>
           </p:cNvSpPr>
@@ -5381,17 +5593,24 @@
           <a:lstStyle/>
           <a:p>
             <a:r>
-              <a:t>Processor控制器层，处理AJAX、PJAX、页面渲染</a:t>
-            </a:r>
-          </a:p>
-          <a:p>
-            <a:r>
-              <a:t>Service服务层，所有交互操作基本都封装在内，兼顾复用与扩展</a:t>
-            </a:r>
-          </a:p>
-          <a:p>
-            <a:r>
-              <a:t>Repository数据访问层，处理JSON数据存取</a:t>
+              <a:t>基于Latke开发，类似SpringMVC的轻量级 </a:t>
+            </a:r>
+            <a:r>
+              <a:rPr lang="en-US"/>
+              <a:t>Web </a:t>
+            </a:r>
+            <a:r>
+              <a:t>框架</a:t>
+            </a:r>
+          </a:p>
+          <a:p>
+            <a:r>
+              <a:t>服务端模板使用FreeMarker</a:t>
+            </a:r>
+          </a:p>
+          <a:p>
+            <a:r>
+              <a:t>前端jQuery，webpack打包</a:t>
             </a:r>
           </a:p>
         </p:txBody>
@@ -5424,7 +5643,7 @@
       </p:grpSpPr>
       <p:sp>
         <p:nvSpPr>
-          <p:cNvPr id="199" name="标题 1"/>
+          <p:cNvPr id="196" name="标题 1"/>
           <p:cNvSpPr txBox="1">
             <a:spLocks noGrp="1"/>
           </p:cNvSpPr>
@@ -5442,14 +5661,14 @@
           <a:lstStyle/>
           <a:p>
             <a:r>
-              <a:t>移动端</a:t>
-            </a:r>
-          </a:p>
-        </p:txBody>
-      </p:sp>
-      <p:sp>
-        <p:nvSpPr>
-          <p:cNvPr id="200" name="内容占位符 2"/>
+              <a:t>MVC分层</a:t>
+            </a:r>
+          </a:p>
+        </p:txBody>
+      </p:sp>
+      <p:sp>
+        <p:nvSpPr>
+          <p:cNvPr id="197" name="内容占位符 2"/>
           <p:cNvSpPr txBox="1">
             <a:spLocks noGrp="1"/>
           </p:cNvSpPr>
@@ -5467,12 +5686,17 @@
           <a:lstStyle/>
           <a:p>
             <a:r>
-              <a:t>单独一套模板进行渲染</a:t>
-            </a:r>
-          </a:p>
-          <a:p>
-            <a:r>
-              <a:t>支持PWA</a:t>
+              <a:t>Processor控制器层，处理AJAX、PJAX、页面渲染</a:t>
+            </a:r>
+          </a:p>
+          <a:p>
+            <a:r>
+              <a:t>Service服务层，所有交互操作基本都封装在内，兼顾复用与扩展</a:t>
+            </a:r>
+          </a:p>
+          <a:p>
+            <a:r>
+              <a:t>Repository数据访问层，处理JSON数据存取</a:t>
             </a:r>
           </a:p>
         </p:txBody>
@@ -5505,7 +5729,7 @@
       </p:grpSpPr>
       <p:sp>
         <p:nvSpPr>
-          <p:cNvPr id="202" name="标题 1"/>
+          <p:cNvPr id="199" name="标题 1"/>
           <p:cNvSpPr txBox="1">
             <a:spLocks noGrp="1"/>
           </p:cNvSpPr>
@@ -5523,14 +5747,14 @@
           <a:lstStyle/>
           <a:p>
             <a:r>
-              <a:t>SEO	</a:t>
-            </a:r>
-          </a:p>
-        </p:txBody>
-      </p:sp>
-      <p:sp>
-        <p:nvSpPr>
-          <p:cNvPr id="203" name="内容占位符 2"/>
+              <a:t>移动端</a:t>
+            </a:r>
+          </a:p>
+        </p:txBody>
+      </p:sp>
+      <p:sp>
+        <p:nvSpPr>
+          <p:cNvPr id="200" name="内容占位符 2"/>
           <p:cNvSpPr txBox="1">
             <a:spLocks noGrp="1"/>
           </p:cNvSpPr>
@@ -5548,12 +5772,12 @@
           <a:lstStyle/>
           <a:p>
             <a:r>
-              <a:t>合理的URL、DOM</a:t>
-            </a:r>
-          </a:p>
-          <a:p>
-            <a:r>
-              <a:t>所有链接精准设置rel</a:t>
+              <a:t>单独一套模板进行渲染</a:t>
+            </a:r>
+          </a:p>
+          <a:p>
+            <a:r>
+              <a:t>支持PWA</a:t>
             </a:r>
           </a:p>
         </p:txBody>
@@ -5586,7 +5810,7 @@
       </p:grpSpPr>
       <p:sp>
         <p:nvSpPr>
-          <p:cNvPr id="205" name="标题 1"/>
+          <p:cNvPr id="202" name="标题 1"/>
           <p:cNvSpPr txBox="1">
             <a:spLocks noGrp="1"/>
           </p:cNvSpPr>
@@ -5604,14 +5828,14 @@
           <a:lstStyle/>
           <a:p>
             <a:r>
-              <a:t>性能优化</a:t>
-            </a:r>
-          </a:p>
-        </p:txBody>
-      </p:sp>
-      <p:sp>
-        <p:nvSpPr>
-          <p:cNvPr id="206" name="内容占位符 2"/>
+              <a:t>SEO	</a:t>
+            </a:r>
+          </a:p>
+        </p:txBody>
+      </p:sp>
+      <p:sp>
+        <p:nvSpPr>
+          <p:cNvPr id="203" name="内容占位符 2"/>
           <p:cNvSpPr txBox="1">
             <a:spLocks noGrp="1"/>
           </p:cNvSpPr>
@@ -5629,33 +5853,36 @@
           <a:lstStyle/>
           <a:p>
             <a:r>
-              <a:t>SQL零join</a:t>
-            </a:r>
-          </a:p>
-          <a:p>
-            <a:r>
-              <a:t>热数据缓存</a:t>
-            </a:r>
-          </a:p>
-          <a:p>
-            <a:r>
-              <a:t>支持Redis或内存缓存</a:t>
-            </a:r>
-          </a:p>
-          <a:p>
-            <a:r>
-              <a:t>后端耗时埋点与性能监控日志</a:t>
-            </a:r>
-          </a:p>
-          <a:p>
-            <a:r>
-              <a:t>前端按需加载图片、JS</a:t>
-            </a:r>
-          </a:p>
-          <a:p>
-            <a:r>
-              <a:t>前端Service Worker缓存</a:t>
-            </a:r>
+              <a:t>合理的URL、DOM</a:t>
+            </a:r>
+          </a:p>
+          <a:p>
+            <a:r>
+              <a:t>所有链接精准设置rel</a:t>
+            </a:r>
+          </a:p>
+          <a:p>
+            <a:r>
+              <a:rPr lang="zh-CN">
+                <a:ea typeface="宋体" panose="02010600030101010101" pitchFamily="2" charset="-122"/>
+              </a:rPr>
+              <a:t>结构化数据（</a:t>
+            </a:r>
+            <a:r>
+              <a:rPr lang="en-US" altLang="zh-CN">
+                <a:ea typeface="宋体" panose="02010600030101010101" pitchFamily="2" charset="-122"/>
+              </a:rPr>
+              <a:t>JSON-LD</a:t>
+            </a:r>
+            <a:r>
+              <a:rPr lang="zh-CN" altLang="en-US">
+                <a:ea typeface="宋体" panose="02010600030101010101" pitchFamily="2" charset="-122"/>
+              </a:rPr>
+              <a:t>）</a:t>
+            </a:r>
+            <a:endParaRPr lang="zh-CN" altLang="en-US">
+              <a:ea typeface="宋体" panose="02010600030101010101" pitchFamily="2" charset="-122"/>
+            </a:endParaRPr>
           </a:p>
         </p:txBody>
       </p:sp>
@@ -5687,7 +5914,7 @@
       </p:grpSpPr>
       <p:sp>
         <p:nvSpPr>
-          <p:cNvPr id="208" name="标题 1"/>
+          <p:cNvPr id="205" name="标题 1"/>
           <p:cNvSpPr txBox="1">
             <a:spLocks noGrp="1"/>
           </p:cNvSpPr>
@@ -5705,14 +5932,14 @@
           <a:lstStyle/>
           <a:p>
             <a:r>
-              <a:t>安全性</a:t>
-            </a:r>
-          </a:p>
-        </p:txBody>
-      </p:sp>
-      <p:sp>
-        <p:nvSpPr>
-          <p:cNvPr id="209" name="内容占位符 2"/>
+              <a:t>性能优化</a:t>
+            </a:r>
+          </a:p>
+        </p:txBody>
+      </p:sp>
+      <p:sp>
+        <p:nvSpPr>
+          <p:cNvPr id="206" name="内容占位符 2"/>
           <p:cNvSpPr txBox="1">
             <a:spLocks noGrp="1"/>
           </p:cNvSpPr>
@@ -5730,22 +5957,38 @@
           <a:lstStyle/>
           <a:p>
             <a:r>
-              <a:t>全面防御XSS、CSRF</a:t>
-            </a:r>
-          </a:p>
-          <a:p>
-            <a:r>
-              <a:t>内置CC攻击过滤</a:t>
-            </a:r>
-          </a:p>
-          <a:p>
-            <a:r>
-              <a:t>支持敏感词配置</a:t>
-            </a:r>
-          </a:p>
-          <a:p>
-            <a:r>
-              <a:t>可接入微信提供的内容安全校验接口</a:t>
+              <a:rPr lang="zh-CN">
+                <a:ea typeface="宋体" panose="02010600030101010101" pitchFamily="2" charset="-122"/>
+              </a:rPr>
+              <a:t>尽量避免</a:t>
+            </a:r>
+            <a:r>
+              <a:t>SQL join</a:t>
+            </a:r>
+          </a:p>
+          <a:p>
+            <a:r>
+              <a:t>热数据缓存</a:t>
+            </a:r>
+          </a:p>
+          <a:p>
+            <a:r>
+              <a:t>支持Redis或内存缓存</a:t>
+            </a:r>
+          </a:p>
+          <a:p>
+            <a:r>
+              <a:t>后端耗时埋点与性能监控日志</a:t>
+            </a:r>
+          </a:p>
+          <a:p>
+            <a:r>
+              <a:t>前端按需加载图片、JS</a:t>
+            </a:r>
+          </a:p>
+          <a:p>
+            <a:r>
+              <a:t>前端Service Worker缓存</a:t>
             </a:r>
           </a:p>
         </p:txBody>
@@ -5778,6 +6021,97 @@
       </p:grpSpPr>
       <p:sp>
         <p:nvSpPr>
+          <p:cNvPr id="208" name="标题 1"/>
+          <p:cNvSpPr txBox="1">
+            <a:spLocks noGrp="1"/>
+          </p:cNvSpPr>
+          <p:nvPr>
+            <p:ph type="title"/>
+          </p:nvPr>
+        </p:nvSpPr>
+        <p:spPr>
+          <a:prstGeom prst="rect">
+            <a:avLst/>
+          </a:prstGeom>
+        </p:spPr>
+        <p:txBody>
+          <a:bodyPr/>
+          <a:lstStyle/>
+          <a:p>
+            <a:r>
+              <a:t>安全性</a:t>
+            </a:r>
+          </a:p>
+        </p:txBody>
+      </p:sp>
+      <p:sp>
+        <p:nvSpPr>
+          <p:cNvPr id="209" name="内容占位符 2"/>
+          <p:cNvSpPr txBox="1">
+            <a:spLocks noGrp="1"/>
+          </p:cNvSpPr>
+          <p:nvPr>
+            <p:ph type="body" idx="1"/>
+          </p:nvPr>
+        </p:nvSpPr>
+        <p:spPr>
+          <a:prstGeom prst="rect">
+            <a:avLst/>
+          </a:prstGeom>
+        </p:spPr>
+        <p:txBody>
+          <a:bodyPr/>
+          <a:lstStyle/>
+          <a:p>
+            <a:r>
+              <a:t>全面防御XSS、CSRF</a:t>
+            </a:r>
+          </a:p>
+          <a:p>
+            <a:r>
+              <a:t>内置CC攻击过滤</a:t>
+            </a:r>
+          </a:p>
+          <a:p>
+            <a:r>
+              <a:t>支持敏感词配置</a:t>
+            </a:r>
+          </a:p>
+          <a:p>
+            <a:r>
+              <a:t>可接入微信提供的内容安全校验接口</a:t>
+            </a:r>
+          </a:p>
+        </p:txBody>
+      </p:sp>
+    </p:spTree>
+  </p:cSld>
+  <p:clrMapOvr>
+    <a:masterClrMapping/>
+  </p:clrMapOvr>
+  <p:transition spd="med"/>
+</p:sld>
+</file>
+
+<file path=ppt/slides/slide27.xml><?xml version="1.0" encoding="utf-8"?>
+<p:sld xmlns:a="http://schemas.openxmlformats.org/drawingml/2006/main" xmlns:r="http://schemas.openxmlformats.org/officeDocument/2006/relationships" xmlns:p="http://schemas.openxmlformats.org/presentationml/2006/main">
+  <p:cSld>
+    <p:spTree>
+      <p:nvGrpSpPr>
+        <p:cNvPr id="1" name=""/>
+        <p:cNvGrpSpPr/>
+        <p:nvPr/>
+      </p:nvGrpSpPr>
+      <p:grpSpPr>
+        <a:xfrm>
+          <a:off x="0" y="0"/>
+          <a:ext cx="0" cy="0"/>
+          <a:chOff x="0" y="0"/>
+          <a:chExt cx="0" cy="0"/>
+        </a:xfrm>
+      </p:grpSpPr>
+      <p:sp>
+        <p:nvSpPr>
           <p:cNvPr id="211" name="标题 1"/>
           <p:cNvSpPr txBox="1">
             <a:spLocks noGrp="1"/>
@@ -5998,20 +6332,25 @@
           <a:lstStyle/>
           <a:p>
             <a:r>
-              <a:t>汇桔网 </a:t>
-            </a:r>
-            <a:r>
-              <a:rPr u="sng">
-                <a:solidFill>
-                  <a:srgbClr val="0563C1"/>
-                </a:solidFill>
-                <a:uFill>
-                  <a:solidFill>
-                    <a:srgbClr val="0563C1"/>
-                  </a:solidFill>
-                </a:uFill>
+              <a:rPr lang="zh-CN">
+                <a:ea typeface="宋体" panose="02010600030101010101" pitchFamily="2" charset="-122"/>
               </a:rPr>
-              <a:t>https://bbs.wtoip.com</a:t>
+              <a:t>快递</a:t>
+            </a:r>
+            <a:r>
+              <a:rPr lang="en-US" altLang="zh-CN">
+                <a:ea typeface="宋体" panose="02010600030101010101" pitchFamily="2" charset="-122"/>
+              </a:rPr>
+              <a:t>100</a:t>
+            </a:r>
+            <a:r>
+              <a:t> </a:t>
+            </a:r>
+            <a:r>
+              <a:rPr>
+                <a:hlinkClick r:id="rId1" tooltip="" action="ppaction://hlinkfile"/>
+              </a:rPr>
+              <a:t>https://bbs.kuaidi100.com</a:t>
             </a:r>
           </a:p>
           <a:p>
@@ -6042,6 +6381,16 @@
               </a:rPr>
               <a:t>http://c.raqsoft.com.cn</a:t>
             </a:r>
+            <a:endParaRPr u="sng">
+              <a:solidFill>
+                <a:srgbClr val="0563C1"/>
+              </a:solidFill>
+              <a:uFill>
+                <a:solidFill>
+                  <a:srgbClr val="0563C1"/>
+                </a:solidFill>
+              </a:uFill>
+            </a:endParaRPr>
           </a:p>
           <a:p>
             <a:r>
@@ -6063,35 +6412,59 @@
           </a:p>
           <a:p>
             <a:r>
-              <a:t>GeeCall极客社区 </a:t>
+              <a:t>深圳金蝶 </a:t>
             </a:r>
             <a:r>
               <a:rPr>
-                <a:hlinkClick r:id="rId4"/>
-              </a:rPr>
-              <a:t>http://geecall.com</a:t>
-            </a:r>
-          </a:p>
-          <a:p>
-            <a:r>
-              <a:t>深圳平安（在建中，三村晖教育平台社区）</a:t>
-            </a:r>
-          </a:p>
-          <a:p>
-            <a:r>
-              <a:t>深圳金蝶 </a:t>
-            </a:r>
-            <a:r>
-              <a:rPr>
-                <a:hlinkClick r:id="rId5" action="ppaction://hlinkfile"/>
+                <a:hlinkClick r:id="rId4" tooltip="" action="ppaction://hlinkfile"/>
               </a:rPr>
               <a:t>https://cs.jdy.com</a:t>
             </a:r>
           </a:p>
           <a:p>
             <a:r>
-              <a:t>……</a:t>
-            </a:r>
+              <a:rPr lang="zh-CN" altLang="en-US">
+                <a:ea typeface="宋体" panose="02010600030101010101" pitchFamily="2" charset="-122"/>
+              </a:rPr>
+              <a:t>某银行集团（</a:t>
+            </a:r>
+            <a:r>
+              <a:rPr lang="en-US" altLang="zh-CN">
+                <a:ea typeface="宋体" panose="02010600030101010101" pitchFamily="2" charset="-122"/>
+                <a:sym typeface="+mn-ea"/>
+              </a:rPr>
+              <a:t>8</a:t>
+            </a:r>
+            <a:r>
+              <a:rPr lang="zh-CN" altLang="en-US">
+                <a:ea typeface="宋体" panose="02010600030101010101" pitchFamily="2" charset="-122"/>
+                <a:sym typeface="+mn-ea"/>
+              </a:rPr>
+              <a:t>万</a:t>
+            </a:r>
+            <a:r>
+              <a:rPr lang="en-US" altLang="zh-CN">
+                <a:ea typeface="宋体" panose="02010600030101010101" pitchFamily="2" charset="-122"/>
+                <a:sym typeface="+mn-ea"/>
+              </a:rPr>
+              <a:t>+</a:t>
+            </a:r>
+            <a:r>
+              <a:rPr lang="zh-CN" altLang="en-US">
+                <a:ea typeface="宋体" panose="02010600030101010101" pitchFamily="2" charset="-122"/>
+                <a:sym typeface="+mn-ea"/>
+              </a:rPr>
+              <a:t>员工）</a:t>
+            </a:r>
+            <a:r>
+              <a:rPr lang="zh-CN" altLang="en-US">
+                <a:ea typeface="宋体" panose="02010600030101010101" pitchFamily="2" charset="-122"/>
+              </a:rPr>
+              <a:t>内网论坛</a:t>
+            </a:r>
+            <a:endParaRPr lang="zh-CN" altLang="en-US">
+              <a:ea typeface="宋体" panose="02010600030101010101" pitchFamily="2" charset="-122"/>
+            </a:endParaRPr>
           </a:p>
         </p:txBody>
       </p:sp>
@@ -6197,7 +6570,27 @@
               <a:defRPr sz="2200"/>
             </a:pPr>
             <a:r>
-              <a:t>贡献系统（用户角色与权限）</a:t>
+              <a:t>贡献系统（用户角色与</a:t>
+            </a:r>
+            <a:r>
+              <a:rPr lang="zh-CN">
+                <a:ea typeface="宋体" panose="02010600030101010101" pitchFamily="2" charset="-122"/>
+              </a:rPr>
+              <a:t>功能级</a:t>
+            </a:r>
+            <a:r>
+              <a:t>权限）</a:t>
+            </a:r>
+          </a:p>
+          <a:p>
+            <a:pPr marL="314325" indent="-314325">
+              <a:defRPr sz="2200"/>
+            </a:pPr>
+            <a:r>
+              <a:rPr lang="zh-CN">
+                <a:ea typeface="宋体" panose="02010600030101010101" pitchFamily="2" charset="-122"/>
+              </a:rPr>
+              <a:t>主持人系统（版主，数据级权限）</a:t>
             </a:r>
           </a:p>
           <a:p>
@@ -6329,7 +6722,16 @@
           <a:lstStyle/>
           <a:p>
             <a:r>
-              <a:t>大部分操作消耗积分（防止垃圾内容）</a:t>
+              <a:t>大部分操作消耗积分（防止垃圾内容</a:t>
+            </a:r>
+            <a:r>
+              <a:rPr lang="zh-CN">
+                <a:ea typeface="宋体" panose="02010600030101010101" pitchFamily="2" charset="-122"/>
+              </a:rPr>
+              <a:t>，促使用户创造有价值的内容</a:t>
+            </a:r>
+            <a:r>
+              <a:t>）</a:t>
             </a:r>
           </a:p>
           <a:p>
@@ -6612,7 +7014,7 @@
 </file>
 
 <file path=ppt/tags/tag1.xml><?xml version="1.0" encoding="utf-8"?>
-<p:tagLst xmlns:a="http://schemas.openxmlformats.org/drawingml/2006/main" xmlns:r="http://schemas.openxmlformats.org/officeDocument/2006/relationships" xmlns:p="http://schemas.openxmlformats.org/presentationml/2006/main">
+<p:tagLst xmlns:p="http://schemas.openxmlformats.org/presentationml/2006/main">
   <p:tag name="KSO_WM_DOC_GUID" val="{fceee0d5-dd62-4a8f-8d5e-b465a83cc8a5}"/>
 </p:tagLst>
 </file>
@@ -7682,7 +8084,6 @@
       </a:style>
     </a:txDef>
   </a:objectDefaults>
-  <a:extraClrSchemeLst/>
   <a:extLst>
     <a:ext uri="{05A4C25C-085E-4340-85A3-A5531E510DB2}">
       <thm15:themeFamily xmlns:thm15="http://schemas.microsoft.com/office/thememl/2012/main" name="Office Theme" id="{62F939B6-93AF-4DB8-9C6B-D6C7DFDC589F}" vid="{4A3C46E8-61CC-4603-A589-7422A47A8E4A}"/>
@@ -8756,7 +9157,6 @@
       </a:style>
     </a:txDef>
   </a:objectDefaults>
-  <a:extraClrSchemeLst/>
   <a:extLst>
     <a:ext uri="{05A4C25C-085E-4340-85A3-A5531E510DB2}">
       <thm15:themeFamily xmlns:thm15="http://schemas.microsoft.com/office/thememl/2012/main" name="Office Theme" id="{62F939B6-93AF-4DB8-9C6B-D6C7DFDC589F}" vid="{4A3C46E8-61CC-4603-A589-7422A47A8E4A}"/>

</xml_diff>